<commit_message>
Upto checkout and user dashboard
</commit_message>
<xml_diff>
--- a/Everest_Phones_Final_Presentation.pptx
+++ b/Everest_Phones_Final_Presentation.pptx
@@ -5,7 +5,7 @@
     <p:sldMasterId id="2147483648" r:id="rId1"/>
   </p:sldMasterIdLst>
   <p:notesMasterIdLst>
-    <p:notesMasterId r:id="rId12"/>
+    <p:notesMasterId r:id="rId15"/>
   </p:notesMasterIdLst>
   <p:sldIdLst>
     <p:sldId id="256" r:id="rId2"/>
@@ -17,7 +17,10 @@
     <p:sldId id="270" r:id="rId8"/>
     <p:sldId id="271" r:id="rId9"/>
     <p:sldId id="272" r:id="rId10"/>
-    <p:sldId id="273" r:id="rId11"/>
+    <p:sldId id="274" r:id="rId11"/>
+    <p:sldId id="275" r:id="rId12"/>
+    <p:sldId id="276" r:id="rId13"/>
+    <p:sldId id="273" r:id="rId14"/>
   </p:sldIdLst>
   <p:sldSz cx="9144000" cy="6858000" type="screen4x3"/>
   <p:notesSz cx="6858000" cy="9144000"/>
@@ -3660,6 +3663,632 @@
 </file>
 
 <file path=ppt/slides/slide10.xml><?xml version="1.0" encoding="utf-8"?>
+<p:sld xmlns:a="http://schemas.openxmlformats.org/drawingml/2006/main" xmlns:r="http://schemas.openxmlformats.org/officeDocument/2006/relationships" xmlns:p="http://schemas.openxmlformats.org/presentationml/2006/main">
+  <p:cSld>
+    <p:spTree>
+      <p:nvGrpSpPr>
+        <p:cNvPr id="1" name=""/>
+        <p:cNvGrpSpPr/>
+        <p:nvPr/>
+      </p:nvGrpSpPr>
+      <p:grpSpPr>
+        <a:xfrm>
+          <a:off x="0" y="0"/>
+          <a:ext cx="0" cy="0"/>
+          <a:chOff x="0" y="0"/>
+          <a:chExt cx="0" cy="0"/>
+        </a:xfrm>
+      </p:grpSpPr>
+      <p:sp>
+        <p:nvSpPr>
+          <p:cNvPr id="2" name="Title 1"/>
+          <p:cNvSpPr>
+            <a:spLocks noGrp="1"/>
+          </p:cNvSpPr>
+          <p:nvPr>
+            <p:ph type="title"/>
+          </p:nvPr>
+        </p:nvSpPr>
+        <p:spPr>
+          <a:xfrm>
+            <a:off x="50800" y="457200"/>
+            <a:ext cx="8229600" cy="1143000"/>
+          </a:xfrm>
+        </p:spPr>
+        <p:txBody>
+          <a:bodyPr>
+            <a:normAutofit/>
+          </a:bodyPr>
+          <a:lstStyle/>
+          <a:p>
+            <a:r>
+              <a:rPr lang="en-US" sz="4000" b="1" dirty="0"/>
+              <a:t>Order History and Tracking</a:t>
+            </a:r>
+            <a:endParaRPr sz="4000" b="1" dirty="0"/>
+          </a:p>
+        </p:txBody>
+      </p:sp>
+      <p:sp>
+        <p:nvSpPr>
+          <p:cNvPr id="3" name="Content Placeholder 2"/>
+          <p:cNvSpPr>
+            <a:spLocks noGrp="1"/>
+          </p:cNvSpPr>
+          <p:nvPr>
+            <p:ph idx="1"/>
+          </p:nvPr>
+        </p:nvSpPr>
+        <p:spPr>
+          <a:xfrm>
+            <a:off x="439818" y="1447800"/>
+            <a:ext cx="8229600" cy="5105400"/>
+          </a:xfrm>
+        </p:spPr>
+        <p:txBody>
+          <a:bodyPr>
+            <a:normAutofit fontScale="92500" lnSpcReduction="20000"/>
+          </a:bodyPr>
+          <a:lstStyle/>
+          <a:p>
+            <a:pPr marL="0" indent="0" algn="just">
+              <a:buNone/>
+            </a:pPr>
+            <a:r>
+              <a:rPr lang="en-US" sz="2400" b="1" dirty="0"/>
+              <a:t>Pending</a:t>
+            </a:r>
+            <a:r>
+              <a:rPr lang="en-US" sz="1900" dirty="0" smtClean="0"/>
+              <a:t>:</a:t>
+            </a:r>
+            <a:endParaRPr lang="en-US" sz="1900" dirty="0"/>
+          </a:p>
+          <a:p>
+            <a:pPr marL="0" indent="0" algn="just">
+              <a:buNone/>
+            </a:pPr>
+            <a:r>
+              <a:rPr lang="en-US" sz="2000" dirty="0"/>
+              <a:t>When you place an order, it is initially in the "Pending" state</a:t>
+            </a:r>
+            <a:r>
+              <a:rPr lang="en-US" sz="2000" dirty="0" smtClean="0"/>
+              <a:t>.</a:t>
+            </a:r>
+          </a:p>
+          <a:p>
+            <a:pPr marL="0" indent="0" algn="just">
+              <a:buNone/>
+            </a:pPr>
+            <a:endParaRPr lang="en-US" sz="1900" dirty="0"/>
+          </a:p>
+          <a:p>
+            <a:pPr marL="0" indent="0" algn="just">
+              <a:buNone/>
+            </a:pPr>
+            <a:r>
+              <a:rPr lang="en-US" sz="2400" b="1" dirty="0"/>
+              <a:t>Paid and Shipped</a:t>
+            </a:r>
+            <a:r>
+              <a:rPr lang="en-US" sz="2400" b="1" dirty="0" smtClean="0"/>
+              <a:t>:</a:t>
+            </a:r>
+            <a:endParaRPr lang="en-US" sz="2400" b="1" dirty="0"/>
+          </a:p>
+          <a:p>
+            <a:pPr algn="just"/>
+            <a:r>
+              <a:rPr lang="en-US" sz="2000" dirty="0"/>
+              <a:t>After payment, the sys admin updates the order status.</a:t>
+            </a:r>
+          </a:p>
+          <a:p>
+            <a:pPr algn="just"/>
+            <a:r>
+              <a:rPr lang="en-US" sz="2000" dirty="0"/>
+              <a:t>The shipping method, tracking number, and ESN for the phone are assigned</a:t>
+            </a:r>
+            <a:r>
+              <a:rPr lang="en-US" sz="2000" dirty="0" smtClean="0"/>
+              <a:t>.</a:t>
+            </a:r>
+          </a:p>
+          <a:p>
+            <a:pPr marL="0" indent="0" algn="just">
+              <a:buNone/>
+            </a:pPr>
+            <a:endParaRPr lang="en-US" sz="2000" dirty="0" smtClean="0"/>
+          </a:p>
+          <a:p>
+            <a:pPr marL="0" indent="0" algn="just">
+              <a:buNone/>
+            </a:pPr>
+            <a:r>
+              <a:rPr lang="en-US" sz="2400" b="1" dirty="0" smtClean="0"/>
+              <a:t>Notifications:</a:t>
+            </a:r>
+            <a:endParaRPr lang="en-US" sz="2400" b="1" dirty="0"/>
+          </a:p>
+          <a:p>
+            <a:r>
+              <a:rPr lang="en-US" sz="2000" dirty="0"/>
+              <a:t>You will be notified via email once your order is shipped.</a:t>
+            </a:r>
+          </a:p>
+          <a:p>
+            <a:r>
+              <a:rPr lang="en-US" sz="2000" dirty="0"/>
+              <a:t>You can track the shipment using the provided tracking number.</a:t>
+            </a:r>
+          </a:p>
+          <a:p>
+            <a:pPr marL="0" indent="0" algn="just">
+              <a:buNone/>
+            </a:pPr>
+            <a:endParaRPr lang="en-US" sz="1900" dirty="0" smtClean="0"/>
+          </a:p>
+          <a:p>
+            <a:pPr marL="0" indent="0" algn="just">
+              <a:buNone/>
+            </a:pPr>
+            <a:r>
+              <a:rPr lang="en-US" sz="2200" b="1" dirty="0" smtClean="0"/>
+              <a:t>Invoice:</a:t>
+            </a:r>
+            <a:endParaRPr lang="en-US" sz="2200" b="1" dirty="0"/>
+          </a:p>
+          <a:p>
+            <a:pPr algn="just"/>
+            <a:r>
+              <a:rPr lang="en-US" sz="1900" dirty="0"/>
+              <a:t>View and download your invoice from the order details page</a:t>
+            </a:r>
+            <a:r>
+              <a:rPr lang="en-US" sz="1900" dirty="0" smtClean="0"/>
+              <a:t>.</a:t>
+            </a:r>
+          </a:p>
+          <a:p>
+            <a:pPr marL="0" indent="0" algn="just">
+              <a:buNone/>
+            </a:pPr>
+            <a:endParaRPr lang="en-US" sz="1900" dirty="0"/>
+          </a:p>
+          <a:p>
+            <a:pPr marL="0" indent="0" algn="just">
+              <a:buNone/>
+            </a:pPr>
+            <a:r>
+              <a:rPr lang="en-US" sz="2200" b="1" dirty="0"/>
+              <a:t>Delivered</a:t>
+            </a:r>
+            <a:r>
+              <a:rPr lang="en-US" sz="2200" b="1" dirty="0" smtClean="0"/>
+              <a:t>:</a:t>
+            </a:r>
+            <a:endParaRPr lang="en-US" sz="2200" b="1" dirty="0"/>
+          </a:p>
+          <a:p>
+            <a:pPr algn="just"/>
+            <a:r>
+              <a:rPr lang="en-US" sz="1800" dirty="0"/>
+              <a:t>Once your order has arrived, the status will be updated to "Delivered".</a:t>
+            </a:r>
+          </a:p>
+          <a:p>
+            <a:pPr algn="just"/>
+            <a:r>
+              <a:rPr lang="en-US" sz="1800" dirty="0"/>
+              <a:t>A final email notification will confirm successful delivery.</a:t>
+            </a:r>
+            <a:endParaRPr lang="en-US" sz="1800" dirty="0"/>
+          </a:p>
+        </p:txBody>
+      </p:sp>
+      <p:pic>
+        <p:nvPicPr>
+          <p:cNvPr id="4" name="Picture 3"/>
+          <p:cNvPicPr>
+            <a:picLocks noChangeAspect="1"/>
+          </p:cNvPicPr>
+          <p:nvPr/>
+        </p:nvPicPr>
+        <p:blipFill>
+          <a:blip r:embed="rId2" cstate="print">
+            <a:extLst>
+              <a:ext uri="{28A0092B-C50C-407E-A947-70E740481C1C}">
+                <a14:useLocalDpi xmlns:a14="http://schemas.microsoft.com/office/drawing/2010/main" val="0"/>
+              </a:ext>
+            </a:extLst>
+          </a:blip>
+          <a:stretch>
+            <a:fillRect/>
+          </a:stretch>
+        </p:blipFill>
+        <p:spPr>
+          <a:xfrm>
+            <a:off x="6743700" y="88900"/>
+            <a:ext cx="2260600" cy="482600"/>
+          </a:xfrm>
+          <a:prstGeom prst="rect">
+            <a:avLst/>
+          </a:prstGeom>
+        </p:spPr>
+      </p:pic>
+      <p:cxnSp>
+        <p:nvCxnSpPr>
+          <p:cNvPr id="5" name="Straight Connector 4"/>
+          <p:cNvCxnSpPr/>
+          <p:nvPr/>
+        </p:nvCxnSpPr>
+        <p:spPr>
+          <a:xfrm flipV="1">
+            <a:off x="145576" y="698636"/>
+            <a:ext cx="8912860" cy="1"/>
+          </a:xfrm>
+          <a:prstGeom prst="line">
+            <a:avLst/>
+          </a:prstGeom>
+        </p:spPr>
+        <p:style>
+          <a:lnRef idx="3">
+            <a:schemeClr val="dk1"/>
+          </a:lnRef>
+          <a:fillRef idx="0">
+            <a:schemeClr val="dk1"/>
+          </a:fillRef>
+          <a:effectRef idx="2">
+            <a:schemeClr val="dk1"/>
+          </a:effectRef>
+          <a:fontRef idx="minor">
+            <a:schemeClr val="tx1"/>
+          </a:fontRef>
+        </p:style>
+      </p:cxnSp>
+    </p:spTree>
+    <p:extLst>
+      <p:ext uri="{BB962C8B-B14F-4D97-AF65-F5344CB8AC3E}">
+        <p14:creationId xmlns:p14="http://schemas.microsoft.com/office/powerpoint/2010/main" val="2448589224"/>
+      </p:ext>
+    </p:extLst>
+  </p:cSld>
+  <p:clrMapOvr>
+    <a:masterClrMapping/>
+  </p:clrMapOvr>
+</p:sld>
+</file>
+
+<file path=ppt/slides/slide11.xml><?xml version="1.0" encoding="utf-8"?>
+<p:sld xmlns:a="http://schemas.openxmlformats.org/drawingml/2006/main" xmlns:r="http://schemas.openxmlformats.org/officeDocument/2006/relationships" xmlns:p="http://schemas.openxmlformats.org/presentationml/2006/main">
+  <p:cSld>
+    <p:spTree>
+      <p:nvGrpSpPr>
+        <p:cNvPr id="1" name=""/>
+        <p:cNvGrpSpPr/>
+        <p:nvPr/>
+      </p:nvGrpSpPr>
+      <p:grpSpPr>
+        <a:xfrm>
+          <a:off x="0" y="0"/>
+          <a:ext cx="0" cy="0"/>
+          <a:chOff x="0" y="0"/>
+          <a:chExt cx="0" cy="0"/>
+        </a:xfrm>
+      </p:grpSpPr>
+      <p:sp>
+        <p:nvSpPr>
+          <p:cNvPr id="2" name="Title 1"/>
+          <p:cNvSpPr>
+            <a:spLocks noGrp="1"/>
+          </p:cNvSpPr>
+          <p:nvPr>
+            <p:ph type="title"/>
+          </p:nvPr>
+        </p:nvSpPr>
+        <p:spPr>
+          <a:xfrm>
+            <a:off x="50800" y="457200"/>
+            <a:ext cx="8229600" cy="1143000"/>
+          </a:xfrm>
+        </p:spPr>
+        <p:txBody>
+          <a:bodyPr>
+            <a:normAutofit/>
+          </a:bodyPr>
+          <a:lstStyle/>
+          <a:p>
+            <a:r>
+              <a:rPr lang="en-US" sz="3400" b="1" dirty="0" smtClean="0"/>
+              <a:t>Some Screenshot of user order dashboard</a:t>
+            </a:r>
+            <a:endParaRPr sz="3400" b="1" dirty="0"/>
+          </a:p>
+        </p:txBody>
+      </p:sp>
+      <p:pic>
+        <p:nvPicPr>
+          <p:cNvPr id="9" name="Content Placeholder 8"/>
+          <p:cNvPicPr>
+            <a:picLocks noGrp="1" noChangeAspect="1"/>
+          </p:cNvPicPr>
+          <p:nvPr>
+            <p:ph idx="1"/>
+          </p:nvPr>
+        </p:nvPicPr>
+        <p:blipFill>
+          <a:blip r:embed="rId2">
+            <a:extLst>
+              <a:ext uri="{28A0092B-C50C-407E-A947-70E740481C1C}">
+                <a14:useLocalDpi xmlns:a14="http://schemas.microsoft.com/office/drawing/2010/main" val="0"/>
+              </a:ext>
+            </a:extLst>
+          </a:blip>
+          <a:stretch>
+            <a:fillRect/>
+          </a:stretch>
+        </p:blipFill>
+        <p:spPr>
+          <a:xfrm>
+            <a:off x="713438" y="3906982"/>
+            <a:ext cx="7031254" cy="2549235"/>
+          </a:xfrm>
+        </p:spPr>
+      </p:pic>
+      <p:pic>
+        <p:nvPicPr>
+          <p:cNvPr id="4" name="Picture 3"/>
+          <p:cNvPicPr>
+            <a:picLocks noChangeAspect="1"/>
+          </p:cNvPicPr>
+          <p:nvPr/>
+        </p:nvPicPr>
+        <p:blipFill>
+          <a:blip r:embed="rId3" cstate="print">
+            <a:extLst>
+              <a:ext uri="{28A0092B-C50C-407E-A947-70E740481C1C}">
+                <a14:useLocalDpi xmlns:a14="http://schemas.microsoft.com/office/drawing/2010/main" val="0"/>
+              </a:ext>
+            </a:extLst>
+          </a:blip>
+          <a:stretch>
+            <a:fillRect/>
+          </a:stretch>
+        </p:blipFill>
+        <p:spPr>
+          <a:xfrm>
+            <a:off x="6743700" y="88900"/>
+            <a:ext cx="2260600" cy="482600"/>
+          </a:xfrm>
+          <a:prstGeom prst="rect">
+            <a:avLst/>
+          </a:prstGeom>
+        </p:spPr>
+      </p:pic>
+      <p:cxnSp>
+        <p:nvCxnSpPr>
+          <p:cNvPr id="5" name="Straight Connector 4"/>
+          <p:cNvCxnSpPr/>
+          <p:nvPr/>
+        </p:nvCxnSpPr>
+        <p:spPr>
+          <a:xfrm flipV="1">
+            <a:off x="145576" y="698636"/>
+            <a:ext cx="8912860" cy="1"/>
+          </a:xfrm>
+          <a:prstGeom prst="line">
+            <a:avLst/>
+          </a:prstGeom>
+        </p:spPr>
+        <p:style>
+          <a:lnRef idx="3">
+            <a:schemeClr val="dk1"/>
+          </a:lnRef>
+          <a:fillRef idx="0">
+            <a:schemeClr val="dk1"/>
+          </a:fillRef>
+          <a:effectRef idx="2">
+            <a:schemeClr val="dk1"/>
+          </a:effectRef>
+          <a:fontRef idx="minor">
+            <a:schemeClr val="tx1"/>
+          </a:fontRef>
+        </p:style>
+      </p:cxnSp>
+      <p:pic>
+        <p:nvPicPr>
+          <p:cNvPr id="8" name="Picture 7"/>
+          <p:cNvPicPr>
+            <a:picLocks noChangeAspect="1"/>
+          </p:cNvPicPr>
+          <p:nvPr/>
+        </p:nvPicPr>
+        <p:blipFill>
+          <a:blip r:embed="rId4">
+            <a:extLst>
+              <a:ext uri="{28A0092B-C50C-407E-A947-70E740481C1C}">
+                <a14:useLocalDpi xmlns:a14="http://schemas.microsoft.com/office/drawing/2010/main" val="0"/>
+              </a:ext>
+            </a:extLst>
+          </a:blip>
+          <a:stretch>
+            <a:fillRect/>
+          </a:stretch>
+        </p:blipFill>
+        <p:spPr>
+          <a:xfrm>
+            <a:off x="1115220" y="1353773"/>
+            <a:ext cx="6449363" cy="2436732"/>
+          </a:xfrm>
+          <a:prstGeom prst="rect">
+            <a:avLst/>
+          </a:prstGeom>
+        </p:spPr>
+      </p:pic>
+    </p:spTree>
+    <p:extLst>
+      <p:ext uri="{BB962C8B-B14F-4D97-AF65-F5344CB8AC3E}">
+        <p14:creationId xmlns:p14="http://schemas.microsoft.com/office/powerpoint/2010/main" val="2992781404"/>
+      </p:ext>
+    </p:extLst>
+  </p:cSld>
+  <p:clrMapOvr>
+    <a:masterClrMapping/>
+  </p:clrMapOvr>
+</p:sld>
+</file>
+
+<file path=ppt/slides/slide12.xml><?xml version="1.0" encoding="utf-8"?>
+<p:sld xmlns:a="http://schemas.openxmlformats.org/drawingml/2006/main" xmlns:r="http://schemas.openxmlformats.org/officeDocument/2006/relationships" xmlns:p="http://schemas.openxmlformats.org/presentationml/2006/main">
+  <p:cSld>
+    <p:spTree>
+      <p:nvGrpSpPr>
+        <p:cNvPr id="1" name=""/>
+        <p:cNvGrpSpPr/>
+        <p:nvPr/>
+      </p:nvGrpSpPr>
+      <p:grpSpPr>
+        <a:xfrm>
+          <a:off x="0" y="0"/>
+          <a:ext cx="0" cy="0"/>
+          <a:chOff x="0" y="0"/>
+          <a:chExt cx="0" cy="0"/>
+        </a:xfrm>
+      </p:grpSpPr>
+      <p:sp>
+        <p:nvSpPr>
+          <p:cNvPr id="2" name="Title 1"/>
+          <p:cNvSpPr>
+            <a:spLocks noGrp="1"/>
+          </p:cNvSpPr>
+          <p:nvPr>
+            <p:ph type="title"/>
+          </p:nvPr>
+        </p:nvSpPr>
+        <p:spPr>
+          <a:xfrm>
+            <a:off x="50800" y="457200"/>
+            <a:ext cx="8229600" cy="1143000"/>
+          </a:xfrm>
+        </p:spPr>
+        <p:txBody>
+          <a:bodyPr>
+            <a:normAutofit/>
+          </a:bodyPr>
+          <a:lstStyle/>
+          <a:p>
+            <a:r>
+              <a:rPr lang="en-US" sz="3400" b="1" dirty="0" smtClean="0"/>
+              <a:t>Screenshot of invoice</a:t>
+            </a:r>
+            <a:endParaRPr sz="3400" b="1" dirty="0"/>
+          </a:p>
+        </p:txBody>
+      </p:sp>
+      <p:pic>
+        <p:nvPicPr>
+          <p:cNvPr id="4" name="Picture 3"/>
+          <p:cNvPicPr>
+            <a:picLocks noChangeAspect="1"/>
+          </p:cNvPicPr>
+          <p:nvPr/>
+        </p:nvPicPr>
+        <p:blipFill>
+          <a:blip r:embed="rId2" cstate="print">
+            <a:extLst>
+              <a:ext uri="{28A0092B-C50C-407E-A947-70E740481C1C}">
+                <a14:useLocalDpi xmlns:a14="http://schemas.microsoft.com/office/drawing/2010/main" val="0"/>
+              </a:ext>
+            </a:extLst>
+          </a:blip>
+          <a:stretch>
+            <a:fillRect/>
+          </a:stretch>
+        </p:blipFill>
+        <p:spPr>
+          <a:xfrm>
+            <a:off x="6743700" y="88900"/>
+            <a:ext cx="2260600" cy="482600"/>
+          </a:xfrm>
+          <a:prstGeom prst="rect">
+            <a:avLst/>
+          </a:prstGeom>
+        </p:spPr>
+      </p:pic>
+      <p:cxnSp>
+        <p:nvCxnSpPr>
+          <p:cNvPr id="5" name="Straight Connector 4"/>
+          <p:cNvCxnSpPr/>
+          <p:nvPr/>
+        </p:nvCxnSpPr>
+        <p:spPr>
+          <a:xfrm flipV="1">
+            <a:off x="145576" y="698636"/>
+            <a:ext cx="8912860" cy="1"/>
+          </a:xfrm>
+          <a:prstGeom prst="line">
+            <a:avLst/>
+          </a:prstGeom>
+        </p:spPr>
+        <p:style>
+          <a:lnRef idx="3">
+            <a:schemeClr val="dk1"/>
+          </a:lnRef>
+          <a:fillRef idx="0">
+            <a:schemeClr val="dk1"/>
+          </a:fillRef>
+          <a:effectRef idx="2">
+            <a:schemeClr val="dk1"/>
+          </a:effectRef>
+          <a:fontRef idx="minor">
+            <a:schemeClr val="tx1"/>
+          </a:fontRef>
+        </p:style>
+      </p:cxnSp>
+      <p:pic>
+        <p:nvPicPr>
+          <p:cNvPr id="6" name="Content Placeholder 5"/>
+          <p:cNvPicPr>
+            <a:picLocks noGrp="1" noChangeAspect="1"/>
+          </p:cNvPicPr>
+          <p:nvPr>
+            <p:ph idx="1"/>
+          </p:nvPr>
+        </p:nvPicPr>
+        <p:blipFill>
+          <a:blip r:embed="rId3">
+            <a:extLst>
+              <a:ext uri="{28A0092B-C50C-407E-A947-70E740481C1C}">
+                <a14:useLocalDpi xmlns:a14="http://schemas.microsoft.com/office/drawing/2010/main" val="0"/>
+              </a:ext>
+            </a:extLst>
+          </a:blip>
+          <a:stretch>
+            <a:fillRect/>
+          </a:stretch>
+        </p:blipFill>
+        <p:spPr>
+          <a:xfrm>
+            <a:off x="982335" y="1634019"/>
+            <a:ext cx="7177992" cy="4780635"/>
+          </a:xfrm>
+        </p:spPr>
+      </p:pic>
+    </p:spTree>
+    <p:extLst>
+      <p:ext uri="{BB962C8B-B14F-4D97-AF65-F5344CB8AC3E}">
+        <p14:creationId xmlns:p14="http://schemas.microsoft.com/office/powerpoint/2010/main" val="3800404456"/>
+      </p:ext>
+    </p:extLst>
+  </p:cSld>
+  <p:clrMapOvr>
+    <a:masterClrMapping/>
+  </p:clrMapOvr>
+</p:sld>
+</file>
+
+<file path=ppt/slides/slide13.xml><?xml version="1.0" encoding="utf-8"?>
 <p:sld xmlns:a="http://schemas.openxmlformats.org/drawingml/2006/main" xmlns:r="http://schemas.openxmlformats.org/officeDocument/2006/relationships" xmlns:p="http://schemas.openxmlformats.org/presentationml/2006/main">
   <p:cSld>
     <p:spTree>

</xml_diff>